<commit_message>
Changed image in ppt
</commit_message>
<xml_diff>
--- a/Money Tracker Presentation.pptx
+++ b/Money Tracker Presentation.pptx
@@ -8301,6 +8301,243 @@
       </p:grpSpPr>
       <p:sp>
         <p:nvSpPr>
+          <p:cNvPr id="7" name="Tekstvak 6">
+            <a:extLst>
+              <a:ext uri="{FF2B5EF4-FFF2-40B4-BE49-F238E27FC236}">
+                <a16:creationId xmlns:a16="http://schemas.microsoft.com/office/drawing/2014/main" id="{6C20B092-2333-459B-94A6-AE4E71A3F54C}"/>
+              </a:ext>
+            </a:extLst>
+          </p:cNvPr>
+          <p:cNvSpPr txBox="1"/>
+          <p:nvPr/>
+        </p:nvSpPr>
+        <p:spPr>
+          <a:xfrm>
+            <a:off x="1807582" y="2188573"/>
+            <a:ext cx="3586454" cy="1615827"/>
+          </a:xfrm>
+          <a:prstGeom prst="rect">
+            <a:avLst/>
+          </a:prstGeom>
+          <a:noFill/>
+        </p:spPr>
+        <p:txBody>
+          <a:bodyPr wrap="square" rtlCol="0">
+            <a:spAutoFit/>
+          </a:bodyPr>
+          <a:lstStyle/>
+          <a:p>
+            <a:pPr marL="285750" indent="-285750">
+              <a:lnSpc>
+                <a:spcPct val="150000"/>
+              </a:lnSpc>
+              <a:buClr>
+                <a:srgbClr val="1287C3"/>
+              </a:buClr>
+              <a:buSzPct val="140000"/>
+              <a:buFont typeface="Arial" panose="020B0604020202020204" pitchFamily="34" charset="0"/>
+              <a:buChar char="•"/>
+            </a:pPr>
+            <a:r>
+              <a:rPr lang="nl-BE" b="1" dirty="0">
+                <a:ln w="0"/>
+                <a:solidFill>
+                  <a:schemeClr val="tx1">
+                    <a:lumMod val="85000"/>
+                    <a:lumOff val="15000"/>
+                  </a:schemeClr>
+                </a:solidFill>
+                <a:latin typeface="Arial Nova Cond" panose="020B0506020202020204" pitchFamily="34" charset="0"/>
+                <a:ea typeface="+mj-ea"/>
+                <a:cs typeface="Arial" panose="020B0604020202020204" pitchFamily="34" charset="0"/>
+              </a:rPr>
+              <a:t>Integration Test </a:t>
+            </a:r>
+            <a:r>
+              <a:rPr lang="nl-BE" sz="1400" b="1" dirty="0">
+                <a:ln w="0"/>
+                <a:solidFill>
+                  <a:schemeClr val="tx1">
+                    <a:lumMod val="75000"/>
+                    <a:lumOff val="25000"/>
+                  </a:schemeClr>
+                </a:solidFill>
+                <a:latin typeface="Arial Nova Cond" panose="020B0506020202020204" pitchFamily="34" charset="0"/>
+                <a:ea typeface="+mj-ea"/>
+                <a:cs typeface="Arial" panose="020B0604020202020204" pitchFamily="34" charset="0"/>
+              </a:rPr>
+              <a:t>(</a:t>
+            </a:r>
+            <a:r>
+              <a:rPr lang="nl-BE" sz="1400" b="1" dirty="0" err="1">
+                <a:ln w="0"/>
+                <a:solidFill>
+                  <a:schemeClr val="tx1">
+                    <a:lumMod val="75000"/>
+                    <a:lumOff val="25000"/>
+                  </a:schemeClr>
+                </a:solidFill>
+                <a:latin typeface="Arial Nova Cond" panose="020B0506020202020204" pitchFamily="34" charset="0"/>
+                <a:ea typeface="+mj-ea"/>
+                <a:cs typeface="Arial" panose="020B0604020202020204" pitchFamily="34" charset="0"/>
+              </a:rPr>
+              <a:t>from</a:t>
+            </a:r>
+            <a:r>
+              <a:rPr lang="nl-BE" sz="1400" b="1" dirty="0">
+                <a:ln w="0"/>
+                <a:solidFill>
+                  <a:schemeClr val="tx1">
+                    <a:lumMod val="75000"/>
+                    <a:lumOff val="25000"/>
+                  </a:schemeClr>
+                </a:solidFill>
+                <a:latin typeface="Arial Nova Cond" panose="020B0506020202020204" pitchFamily="34" charset="0"/>
+                <a:ea typeface="+mj-ea"/>
+                <a:cs typeface="Arial" panose="020B0604020202020204" pitchFamily="34" charset="0"/>
+              </a:rPr>
+              <a:t> Ticket)</a:t>
+            </a:r>
+          </a:p>
+          <a:p>
+            <a:pPr marL="285750" indent="-285750">
+              <a:lnSpc>
+                <a:spcPct val="150000"/>
+              </a:lnSpc>
+              <a:buClr>
+                <a:srgbClr val="1287C3"/>
+              </a:buClr>
+              <a:buSzPct val="140000"/>
+              <a:buFont typeface="Arial" panose="020B0604020202020204" pitchFamily="34" charset="0"/>
+              <a:buChar char="•"/>
+            </a:pPr>
+            <a:endParaRPr lang="nl-BE" b="1" dirty="0">
+              <a:ln w="0"/>
+              <a:solidFill>
+                <a:schemeClr val="tx1">
+                  <a:lumMod val="85000"/>
+                  <a:lumOff val="15000"/>
+                </a:schemeClr>
+              </a:solidFill>
+              <a:latin typeface="Arial Nova Cond" panose="020B0506020202020204" pitchFamily="34" charset="0"/>
+              <a:ea typeface="+mj-ea"/>
+              <a:cs typeface="Arial" panose="020B0604020202020204" pitchFamily="34" charset="0"/>
+            </a:endParaRPr>
+          </a:p>
+          <a:p>
+            <a:pPr marL="285750" indent="-285750">
+              <a:lnSpc>
+                <a:spcPct val="150000"/>
+              </a:lnSpc>
+              <a:buClr>
+                <a:srgbClr val="1287C3"/>
+              </a:buClr>
+              <a:buSzPct val="140000"/>
+              <a:buFont typeface="Arial" panose="020B0604020202020204" pitchFamily="34" charset="0"/>
+              <a:buChar char="•"/>
+            </a:pPr>
+            <a:r>
+              <a:rPr lang="nl-BE" b="1" dirty="0">
+                <a:ln w="0"/>
+                <a:solidFill>
+                  <a:schemeClr val="tx1">
+                    <a:lumMod val="85000"/>
+                    <a:lumOff val="15000"/>
+                  </a:schemeClr>
+                </a:solidFill>
+                <a:latin typeface="Arial Nova Cond" panose="020B0506020202020204" pitchFamily="34" charset="0"/>
+                <a:ea typeface="+mj-ea"/>
+                <a:cs typeface="Arial" panose="020B0604020202020204" pitchFamily="34" charset="0"/>
+              </a:rPr>
+              <a:t>Unit Tests </a:t>
+            </a:r>
+            <a:r>
+              <a:rPr lang="nl-BE" sz="1400" b="1" dirty="0">
+                <a:ln w="0"/>
+                <a:solidFill>
+                  <a:schemeClr val="tx1">
+                    <a:lumMod val="75000"/>
+                    <a:lumOff val="25000"/>
+                  </a:schemeClr>
+                </a:solidFill>
+                <a:latin typeface="Arial Nova Cond" panose="020B0506020202020204" pitchFamily="34" charset="0"/>
+                <a:ea typeface="+mj-ea"/>
+                <a:cs typeface="Arial" panose="020B0604020202020204" pitchFamily="34" charset="0"/>
+              </a:rPr>
+              <a:t>(</a:t>
+            </a:r>
+            <a:r>
+              <a:rPr lang="nl-BE" sz="1400" b="1" dirty="0" err="1">
+                <a:ln w="0"/>
+                <a:solidFill>
+                  <a:schemeClr val="tx1">
+                    <a:lumMod val="75000"/>
+                    <a:lumOff val="25000"/>
+                  </a:schemeClr>
+                </a:solidFill>
+                <a:latin typeface="Arial Nova Cond" panose="020B0506020202020204" pitchFamily="34" charset="0"/>
+                <a:ea typeface="+mj-ea"/>
+                <a:cs typeface="Arial" panose="020B0604020202020204" pitchFamily="34" charset="0"/>
+              </a:rPr>
+              <a:t>from</a:t>
+            </a:r>
+            <a:r>
+              <a:rPr lang="nl-BE" sz="1400" b="1" dirty="0">
+                <a:ln w="0"/>
+                <a:solidFill>
+                  <a:schemeClr val="tx1">
+                    <a:lumMod val="75000"/>
+                    <a:lumOff val="25000"/>
+                  </a:schemeClr>
+                </a:solidFill>
+                <a:latin typeface="Arial Nova Cond" panose="020B0506020202020204" pitchFamily="34" charset="0"/>
+                <a:ea typeface="+mj-ea"/>
+                <a:cs typeface="Arial" panose="020B0604020202020204" pitchFamily="34" charset="0"/>
+              </a:rPr>
+              <a:t> Ticket)</a:t>
+            </a:r>
+          </a:p>
+          <a:p>
+            <a:endParaRPr lang="nl-BE" dirty="0"/>
+          </a:p>
+        </p:txBody>
+      </p:sp>
+      <p:pic>
+        <p:nvPicPr>
+          <p:cNvPr id="4" name="Afbeelding 3">
+            <a:extLst>
+              <a:ext uri="{FF2B5EF4-FFF2-40B4-BE49-F238E27FC236}">
+                <a16:creationId xmlns:a16="http://schemas.microsoft.com/office/drawing/2014/main" id="{109903D3-A34A-46F2-B723-66473339547E}"/>
+              </a:ext>
+            </a:extLst>
+          </p:cNvPr>
+          <p:cNvPicPr>
+            <a:picLocks noChangeAspect="1"/>
+          </p:cNvPicPr>
+          <p:nvPr/>
+        </p:nvPicPr>
+        <p:blipFill rotWithShape="1">
+          <a:blip r:embed="rId2"/>
+          <a:srcRect l="1488" r="12699"/>
+          <a:stretch/>
+        </p:blipFill>
+        <p:spPr>
+          <a:xfrm>
+            <a:off x="5954175" y="2087857"/>
+            <a:ext cx="5443495" cy="3600000"/>
+          </a:xfrm>
+          <a:prstGeom prst="rect">
+            <a:avLst/>
+          </a:prstGeom>
+          <a:ln w="12700">
+            <a:solidFill>
+              <a:schemeClr val="tx1"/>
+            </a:solidFill>
+          </a:ln>
+        </p:spPr>
+      </p:pic>
+      <p:sp>
+        <p:nvSpPr>
           <p:cNvPr id="2" name="Titel 1">
             <a:extLst>
               <a:ext uri="{FF2B5EF4-FFF2-40B4-BE49-F238E27FC236}">
@@ -8369,40 +8606,6 @@
           </a:p>
         </p:txBody>
       </p:sp>
-      <p:pic>
-        <p:nvPicPr>
-          <p:cNvPr id="5" name="Afbeelding 4">
-            <a:extLst>
-              <a:ext uri="{FF2B5EF4-FFF2-40B4-BE49-F238E27FC236}">
-                <a16:creationId xmlns:a16="http://schemas.microsoft.com/office/drawing/2014/main" id="{28852B85-91A6-437B-9532-5EB18309D42A}"/>
-              </a:ext>
-            </a:extLst>
-          </p:cNvPr>
-          <p:cNvPicPr>
-            <a:picLocks noChangeAspect="1"/>
-          </p:cNvPicPr>
-          <p:nvPr/>
-        </p:nvPicPr>
-        <p:blipFill rotWithShape="1">
-          <a:blip r:embed="rId2"/>
-          <a:srcRect l="646" r="23155" b="8459"/>
-          <a:stretch/>
-        </p:blipFill>
-        <p:spPr>
-          <a:xfrm>
-            <a:off x="5954175" y="2087857"/>
-            <a:ext cx="5443495" cy="3600000"/>
-          </a:xfrm>
-          <a:prstGeom prst="rect">
-            <a:avLst/>
-          </a:prstGeom>
-          <a:ln w="12700">
-            <a:solidFill>
-              <a:schemeClr val="tx1"/>
-            </a:solidFill>
-          </a:ln>
-        </p:spPr>
-      </p:pic>
       <p:sp>
         <p:nvSpPr>
           <p:cNvPr id="6" name="Tekstvak 5">
@@ -8495,37 +8698,7 @@
                 <a:ea typeface="+mj-ea"/>
                 <a:cs typeface="Arial" panose="020B0604020202020204" pitchFamily="34" charset="0"/>
               </a:rPr>
-              <a:t>() </a:t>
-            </a:r>
-            <a:r>
-              <a:rPr lang="nl-BE" b="1" dirty="0" err="1">
-                <a:ln w="0"/>
-                <a:solidFill>
-                  <a:schemeClr val="tx1">
-                    <a:lumMod val="85000"/>
-                    <a:lumOff val="15000"/>
-                  </a:schemeClr>
-                </a:solidFill>
-                <a:latin typeface="Arial Nova Cond" panose="020B0506020202020204" pitchFamily="34" charset="0"/>
-                <a:ea typeface="+mj-ea"/>
-                <a:cs typeface="Arial" panose="020B0604020202020204" pitchFamily="34" charset="0"/>
-              </a:rPr>
-              <a:t>from</a:t>
-            </a:r>
-            <a:r>
-              <a:rPr lang="nl-BE" b="1" dirty="0">
-                <a:ln w="0"/>
-                <a:solidFill>
-                  <a:schemeClr val="tx1">
-                    <a:lumMod val="85000"/>
-                    <a:lumOff val="15000"/>
-                  </a:schemeClr>
-                </a:solidFill>
-                <a:latin typeface="Arial Nova Cond" panose="020B0506020202020204" pitchFamily="34" charset="0"/>
-                <a:ea typeface="+mj-ea"/>
-                <a:cs typeface="Arial" panose="020B0604020202020204" pitchFamily="34" charset="0"/>
-              </a:rPr>
-              <a:t> Ticket</a:t>
+              <a:t>()</a:t>
             </a:r>
           </a:p>
           <a:p>
@@ -8803,209 +8976,6 @@
               <a:ea typeface="+mj-ea"/>
               <a:cs typeface="Arial" panose="020B0604020202020204" pitchFamily="34" charset="0"/>
             </a:endParaRPr>
-          </a:p>
-          <a:p>
-            <a:endParaRPr lang="nl-BE" dirty="0"/>
-          </a:p>
-        </p:txBody>
-      </p:sp>
-      <p:sp>
-        <p:nvSpPr>
-          <p:cNvPr id="7" name="Tekstvak 6">
-            <a:extLst>
-              <a:ext uri="{FF2B5EF4-FFF2-40B4-BE49-F238E27FC236}">
-                <a16:creationId xmlns:a16="http://schemas.microsoft.com/office/drawing/2014/main" id="{6C20B092-2333-459B-94A6-AE4E71A3F54C}"/>
-              </a:ext>
-            </a:extLst>
-          </p:cNvPr>
-          <p:cNvSpPr txBox="1"/>
-          <p:nvPr/>
-        </p:nvSpPr>
-        <p:spPr>
-          <a:xfrm>
-            <a:off x="1807582" y="2188573"/>
-            <a:ext cx="3586454" cy="1615827"/>
-          </a:xfrm>
-          <a:prstGeom prst="rect">
-            <a:avLst/>
-          </a:prstGeom>
-          <a:noFill/>
-        </p:spPr>
-        <p:txBody>
-          <a:bodyPr wrap="square" rtlCol="0">
-            <a:spAutoFit/>
-          </a:bodyPr>
-          <a:lstStyle/>
-          <a:p>
-            <a:pPr marL="285750" indent="-285750">
-              <a:lnSpc>
-                <a:spcPct val="150000"/>
-              </a:lnSpc>
-              <a:buClr>
-                <a:srgbClr val="1287C3"/>
-              </a:buClr>
-              <a:buSzPct val="140000"/>
-              <a:buFont typeface="Arial" panose="020B0604020202020204" pitchFamily="34" charset="0"/>
-              <a:buChar char="•"/>
-            </a:pPr>
-            <a:r>
-              <a:rPr lang="nl-BE" b="1" dirty="0">
-                <a:ln w="0"/>
-                <a:solidFill>
-                  <a:schemeClr val="tx1">
-                    <a:lumMod val="85000"/>
-                    <a:lumOff val="15000"/>
-                  </a:schemeClr>
-                </a:solidFill>
-                <a:latin typeface="Arial Nova Cond" panose="020B0506020202020204" pitchFamily="34" charset="0"/>
-                <a:ea typeface="+mj-ea"/>
-                <a:cs typeface="Arial" panose="020B0604020202020204" pitchFamily="34" charset="0"/>
-              </a:rPr>
-              <a:t>Integration Test </a:t>
-            </a:r>
-            <a:r>
-              <a:rPr lang="nl-BE" sz="1400" b="1" dirty="0">
-                <a:ln w="0"/>
-                <a:solidFill>
-                  <a:schemeClr val="tx1">
-                    <a:lumMod val="75000"/>
-                    <a:lumOff val="25000"/>
-                  </a:schemeClr>
-                </a:solidFill>
-                <a:latin typeface="Arial Nova Cond" panose="020B0506020202020204" pitchFamily="34" charset="0"/>
-                <a:ea typeface="+mj-ea"/>
-                <a:cs typeface="Arial" panose="020B0604020202020204" pitchFamily="34" charset="0"/>
-              </a:rPr>
-              <a:t>(</a:t>
-            </a:r>
-            <a:r>
-              <a:rPr lang="nl-BE" sz="1400" b="1" dirty="0" err="1">
-                <a:ln w="0"/>
-                <a:solidFill>
-                  <a:schemeClr val="tx1">
-                    <a:lumMod val="75000"/>
-                    <a:lumOff val="25000"/>
-                  </a:schemeClr>
-                </a:solidFill>
-                <a:latin typeface="Arial Nova Cond" panose="020B0506020202020204" pitchFamily="34" charset="0"/>
-                <a:ea typeface="+mj-ea"/>
-                <a:cs typeface="Arial" panose="020B0604020202020204" pitchFamily="34" charset="0"/>
-              </a:rPr>
-              <a:t>from</a:t>
-            </a:r>
-            <a:r>
-              <a:rPr lang="nl-BE" sz="1400" b="1" dirty="0">
-                <a:ln w="0"/>
-                <a:solidFill>
-                  <a:schemeClr val="tx1">
-                    <a:lumMod val="75000"/>
-                    <a:lumOff val="25000"/>
-                  </a:schemeClr>
-                </a:solidFill>
-                <a:latin typeface="Arial Nova Cond" panose="020B0506020202020204" pitchFamily="34" charset="0"/>
-                <a:ea typeface="+mj-ea"/>
-                <a:cs typeface="Arial" panose="020B0604020202020204" pitchFamily="34" charset="0"/>
-              </a:rPr>
-              <a:t> Ticket)</a:t>
-            </a:r>
-          </a:p>
-          <a:p>
-            <a:pPr marL="285750" indent="-285750">
-              <a:lnSpc>
-                <a:spcPct val="150000"/>
-              </a:lnSpc>
-              <a:buClr>
-                <a:srgbClr val="1287C3"/>
-              </a:buClr>
-              <a:buSzPct val="140000"/>
-              <a:buFont typeface="Arial" panose="020B0604020202020204" pitchFamily="34" charset="0"/>
-              <a:buChar char="•"/>
-            </a:pPr>
-            <a:endParaRPr lang="nl-BE" b="1" dirty="0">
-              <a:ln w="0"/>
-              <a:solidFill>
-                <a:schemeClr val="tx1">
-                  <a:lumMod val="85000"/>
-                  <a:lumOff val="15000"/>
-                </a:schemeClr>
-              </a:solidFill>
-              <a:latin typeface="Arial Nova Cond" panose="020B0506020202020204" pitchFamily="34" charset="0"/>
-              <a:ea typeface="+mj-ea"/>
-              <a:cs typeface="Arial" panose="020B0604020202020204" pitchFamily="34" charset="0"/>
-            </a:endParaRPr>
-          </a:p>
-          <a:p>
-            <a:pPr marL="285750" indent="-285750">
-              <a:lnSpc>
-                <a:spcPct val="150000"/>
-              </a:lnSpc>
-              <a:buClr>
-                <a:srgbClr val="1287C3"/>
-              </a:buClr>
-              <a:buSzPct val="140000"/>
-              <a:buFont typeface="Arial" panose="020B0604020202020204" pitchFamily="34" charset="0"/>
-              <a:buChar char="•"/>
-            </a:pPr>
-            <a:r>
-              <a:rPr lang="nl-BE" b="1" dirty="0">
-                <a:ln w="0"/>
-                <a:solidFill>
-                  <a:schemeClr val="tx1">
-                    <a:lumMod val="85000"/>
-                    <a:lumOff val="15000"/>
-                  </a:schemeClr>
-                </a:solidFill>
-                <a:latin typeface="Arial Nova Cond" panose="020B0506020202020204" pitchFamily="34" charset="0"/>
-                <a:ea typeface="+mj-ea"/>
-                <a:cs typeface="Arial" panose="020B0604020202020204" pitchFamily="34" charset="0"/>
-              </a:rPr>
-              <a:t>Unit Tests </a:t>
-            </a:r>
-            <a:r>
-              <a:rPr lang="nl-BE" sz="1400" b="1" dirty="0">
-                <a:ln w="0"/>
-                <a:solidFill>
-                  <a:schemeClr val="tx1">
-                    <a:lumMod val="75000"/>
-                    <a:lumOff val="25000"/>
-                  </a:schemeClr>
-                </a:solidFill>
-                <a:latin typeface="Arial Nova Cond" panose="020B0506020202020204" pitchFamily="34" charset="0"/>
-                <a:ea typeface="+mj-ea"/>
-                <a:cs typeface="Arial" panose="020B0604020202020204" pitchFamily="34" charset="0"/>
-              </a:rPr>
-              <a:t>(</a:t>
-            </a:r>
-            <a:r>
-              <a:rPr lang="nl-BE" sz="1400" b="1" dirty="0" err="1">
-                <a:ln w="0"/>
-                <a:solidFill>
-                  <a:schemeClr val="tx1">
-                    <a:lumMod val="75000"/>
-                    <a:lumOff val="25000"/>
-                  </a:schemeClr>
-                </a:solidFill>
-                <a:latin typeface="Arial Nova Cond" panose="020B0506020202020204" pitchFamily="34" charset="0"/>
-                <a:ea typeface="+mj-ea"/>
-                <a:cs typeface="Arial" panose="020B0604020202020204" pitchFamily="34" charset="0"/>
-              </a:rPr>
-              <a:t>from</a:t>
-            </a:r>
-            <a:r>
-              <a:rPr lang="nl-BE" sz="1400" b="1" dirty="0">
-                <a:ln w="0"/>
-                <a:solidFill>
-                  <a:schemeClr val="tx1">
-                    <a:lumMod val="75000"/>
-                    <a:lumOff val="25000"/>
-                  </a:schemeClr>
-                </a:solidFill>
-                <a:latin typeface="Arial Nova Cond" panose="020B0506020202020204" pitchFamily="34" charset="0"/>
-                <a:ea typeface="+mj-ea"/>
-                <a:cs typeface="Arial" panose="020B0604020202020204" pitchFamily="34" charset="0"/>
-              </a:rPr>
-              <a:t> Ticket)</a:t>
-            </a:r>
           </a:p>
           <a:p>
             <a:endParaRPr lang="nl-BE" dirty="0"/>
@@ -9047,10 +9017,10 @@
       </p:grpSpPr>
       <p:pic>
         <p:nvPicPr>
-          <p:cNvPr id="3074" name="Picture 2" descr="Intel's Alder Lake Combines 'Performance' and 'Efficiency' CPU Cores on One  Chip | PCMag">
+          <p:cNvPr id="1026" name="Picture 2" descr="Five 'Under The Hood' Secrets You Must Read Before Buying A New Car | House  of Cars Calgary">
             <a:extLst>
               <a:ext uri="{FF2B5EF4-FFF2-40B4-BE49-F238E27FC236}">
-                <a16:creationId xmlns:a16="http://schemas.microsoft.com/office/drawing/2014/main" id="{316953B4-B0C3-491B-AAFA-86E4557C548F}"/>
+                <a16:creationId xmlns:a16="http://schemas.microsoft.com/office/drawing/2014/main" id="{796B116C-5666-4042-B802-B63BE62D7576}"/>
               </a:ext>
             </a:extLst>
           </p:cNvPr>
@@ -9059,7 +9029,7 @@
           </p:cNvPicPr>
           <p:nvPr/>
         </p:nvPicPr>
-        <p:blipFill rotWithShape="1">
+        <p:blipFill>
           <a:blip r:embed="rId2">
             <a:extLst>
               <a:ext uri="{28A0092B-C50C-407E-A947-70E740481C1C}">
@@ -9067,12 +9037,14 @@
               </a:ext>
             </a:extLst>
           </a:blip>
-          <a:srcRect l="9237" r="5708"/>
-          <a:stretch/>
+          <a:srcRect/>
+          <a:stretch>
+            <a:fillRect/>
+          </a:stretch>
         </p:blipFill>
         <p:spPr bwMode="auto">
           <a:xfrm>
-            <a:off x="5954175" y="2087857"/>
+            <a:off x="5954175" y="2087858"/>
             <a:ext cx="5443495" cy="3600000"/>
           </a:xfrm>
           <a:prstGeom prst="rect">
@@ -9162,7 +9134,7 @@
                 <a:ea typeface="+mj-ea"/>
                 <a:cs typeface="Arial" panose="020B0604020202020204" pitchFamily="34" charset="0"/>
               </a:rPr>
-              <a:t> </a:t>
+              <a:t> For Total </a:t>
             </a:r>
             <a:r>
               <a:rPr lang="nl-BE" b="1" dirty="0" err="1">
@@ -9177,67 +9149,7 @@
                 <a:ea typeface="+mj-ea"/>
                 <a:cs typeface="Arial" panose="020B0604020202020204" pitchFamily="34" charset="0"/>
               </a:rPr>
-              <a:t>for</a:t>
-            </a:r>
-            <a:r>
-              <a:rPr lang="nl-BE" b="1" dirty="0">
-                <a:ln w="0"/>
-                <a:solidFill>
-                  <a:schemeClr val="tx1">
-                    <a:lumMod val="85000"/>
-                    <a:lumOff val="15000"/>
-                  </a:schemeClr>
-                </a:solidFill>
-                <a:latin typeface="Arial Nova Cond" panose="020B0506020202020204" pitchFamily="34" charset="0"/>
-                <a:ea typeface="+mj-ea"/>
-                <a:cs typeface="Arial" panose="020B0604020202020204" pitchFamily="34" charset="0"/>
-              </a:rPr>
-              <a:t> </a:t>
-            </a:r>
-            <a:r>
-              <a:rPr lang="nl-BE" b="1" dirty="0" err="1">
-                <a:ln w="0"/>
-                <a:solidFill>
-                  <a:schemeClr val="tx1">
-                    <a:lumMod val="85000"/>
-                    <a:lumOff val="15000"/>
-                  </a:schemeClr>
-                </a:solidFill>
-                <a:latin typeface="Arial Nova Cond" panose="020B0506020202020204" pitchFamily="34" charset="0"/>
-                <a:ea typeface="+mj-ea"/>
-                <a:cs typeface="Arial" panose="020B0604020202020204" pitchFamily="34" charset="0"/>
-              </a:rPr>
-              <a:t>total</a:t>
-            </a:r>
-            <a:r>
-              <a:rPr lang="nl-BE" b="1" dirty="0">
-                <a:ln w="0"/>
-                <a:solidFill>
-                  <a:schemeClr val="tx1">
-                    <a:lumMod val="85000"/>
-                    <a:lumOff val="15000"/>
-                  </a:schemeClr>
-                </a:solidFill>
-                <a:latin typeface="Arial Nova Cond" panose="020B0506020202020204" pitchFamily="34" charset="0"/>
-                <a:ea typeface="+mj-ea"/>
-                <a:cs typeface="Arial" panose="020B0604020202020204" pitchFamily="34" charset="0"/>
-              </a:rPr>
-              <a:t> </a:t>
-            </a:r>
-            <a:r>
-              <a:rPr lang="nl-BE" b="1" dirty="0" err="1">
-                <a:ln w="0"/>
-                <a:solidFill>
-                  <a:schemeClr val="tx1">
-                    <a:lumMod val="85000"/>
-                    <a:lumOff val="15000"/>
-                  </a:schemeClr>
-                </a:solidFill>
-                <a:latin typeface="Arial Nova Cond" panose="020B0506020202020204" pitchFamily="34" charset="0"/>
-                <a:ea typeface="+mj-ea"/>
-                <a:cs typeface="Arial" panose="020B0604020202020204" pitchFamily="34" charset="0"/>
-              </a:rPr>
-              <a:t>seperation</a:t>
+              <a:t>Seperation</a:t>
             </a:r>
             <a:endParaRPr lang="nl-BE" b="1" dirty="0">
               <a:ln w="0"/>

</xml_diff>